<commit_message>
Update BsidesKC 2023 Badge CTF.pptx
</commit_message>
<xml_diff>
--- a/CTF/BsidesKC 2023 Badge CTF.pptx
+++ b/CTF/BsidesKC 2023 Badge CTF.pptx
@@ -4771,7 +4771,7 @@
         <p:spPr/>
         <p:txBody>
           <a:bodyPr>
-            <a:normAutofit fontScale="92500" lnSpcReduction="10000"/>
+            <a:normAutofit fontScale="55000" lnSpcReduction="20000"/>
           </a:bodyPr>
           <a:lstStyle/>
           <a:p>
@@ -4861,6 +4861,54 @@
               <a:rPr lang="en-US" dirty="0"/>
               <a:t>Serial Port flag</a:t>
             </a:r>
+          </a:p>
+          <a:p>
+            <a:r>
+              <a:rPr lang="en-US" dirty="0" err="1"/>
+              <a:t>Github</a:t>
+            </a:r>
+            <a:r>
+              <a:rPr lang="en-US" dirty="0"/>
+              <a:t> flag</a:t>
+            </a:r>
+          </a:p>
+          <a:p>
+            <a:r>
+              <a:rPr lang="en-US" dirty="0"/>
+              <a:t>Steganography</a:t>
+            </a:r>
+          </a:p>
+          <a:p>
+            <a:r>
+              <a:rPr lang="en-US" dirty="0"/>
+              <a:t>Crypto Challenge</a:t>
+            </a:r>
+          </a:p>
+          <a:p>
+            <a:r>
+              <a:rPr lang="en-US" dirty="0" err="1"/>
+              <a:t>Youtube</a:t>
+            </a:r>
+            <a:r>
+              <a:rPr lang="en-US" dirty="0"/>
+              <a:t> video?</a:t>
+            </a:r>
+          </a:p>
+          <a:p>
+            <a:r>
+              <a:rPr lang="en-US" dirty="0"/>
+              <a:t>IVR Extension + Morse code</a:t>
+            </a:r>
+          </a:p>
+          <a:p>
+            <a:r>
+              <a:rPr lang="en-US"/>
+              <a:t> </a:t>
+            </a:r>
+            <a:endParaRPr lang="en-US" dirty="0"/>
+          </a:p>
+          <a:p>
+            <a:endParaRPr lang="en-US" dirty="0"/>
           </a:p>
           <a:p>
             <a:endParaRPr lang="en-US" dirty="0"/>

</xml_diff>